<commit_message>
Merge remote changes with unrelated histories
</commit_message>
<xml_diff>
--- a/視窗程式設計期末.pptx
+++ b/視窗程式設計期末.pptx
@@ -484,7 +484,7 @@
           <a:p>
             <a:fld id="{E013691C-8798-4279-96DE-5BDD4CCC38DB}" type="datetimeFigureOut">
               <a:rPr lang="zh-TW" altLang="en-US" smtClean="0"/>
-              <a:t>2025/1/6</a:t>
+              <a:t>2025/1/7</a:t>
             </a:fld>
             <a:endParaRPr lang="zh-TW" altLang="en-US"/>
           </a:p>
@@ -985,7 +985,7 @@
           <a:p>
             <a:fld id="{CA1AE8AC-2A7D-4E70-B7DE-C17D242DA6D2}" type="datetimeFigureOut">
               <a:rPr lang="zh-TW" altLang="en-US" smtClean="0"/>
-              <a:t>2025/1/6</a:t>
+              <a:t>2025/1/7</a:t>
             </a:fld>
             <a:endParaRPr lang="zh-TW" altLang="en-US"/>
           </a:p>
@@ -1183,7 +1183,7 @@
           <a:p>
             <a:fld id="{CA1AE8AC-2A7D-4E70-B7DE-C17D242DA6D2}" type="datetimeFigureOut">
               <a:rPr lang="zh-TW" altLang="en-US" smtClean="0"/>
-              <a:t>2025/1/6</a:t>
+              <a:t>2025/1/7</a:t>
             </a:fld>
             <a:endParaRPr lang="zh-TW" altLang="en-US"/>
           </a:p>
@@ -1391,7 +1391,7 @@
           <a:p>
             <a:fld id="{CA1AE8AC-2A7D-4E70-B7DE-C17D242DA6D2}" type="datetimeFigureOut">
               <a:rPr lang="zh-TW" altLang="en-US" smtClean="0"/>
-              <a:t>2025/1/6</a:t>
+              <a:t>2025/1/7</a:t>
             </a:fld>
             <a:endParaRPr lang="zh-TW" altLang="en-US"/>
           </a:p>
@@ -1589,7 +1589,7 @@
           <a:p>
             <a:fld id="{CA1AE8AC-2A7D-4E70-B7DE-C17D242DA6D2}" type="datetimeFigureOut">
               <a:rPr lang="zh-TW" altLang="en-US" smtClean="0"/>
-              <a:t>2025/1/6</a:t>
+              <a:t>2025/1/7</a:t>
             </a:fld>
             <a:endParaRPr lang="zh-TW" altLang="en-US"/>
           </a:p>
@@ -1864,7 +1864,7 @@
           <a:p>
             <a:fld id="{CA1AE8AC-2A7D-4E70-B7DE-C17D242DA6D2}" type="datetimeFigureOut">
               <a:rPr lang="zh-TW" altLang="en-US" smtClean="0"/>
-              <a:t>2025/1/6</a:t>
+              <a:t>2025/1/7</a:t>
             </a:fld>
             <a:endParaRPr lang="zh-TW" altLang="en-US"/>
           </a:p>
@@ -2129,7 +2129,7 @@
           <a:p>
             <a:fld id="{CA1AE8AC-2A7D-4E70-B7DE-C17D242DA6D2}" type="datetimeFigureOut">
               <a:rPr lang="zh-TW" altLang="en-US" smtClean="0"/>
-              <a:t>2025/1/6</a:t>
+              <a:t>2025/1/7</a:t>
             </a:fld>
             <a:endParaRPr lang="zh-TW" altLang="en-US"/>
           </a:p>
@@ -2541,7 +2541,7 @@
           <a:p>
             <a:fld id="{CA1AE8AC-2A7D-4E70-B7DE-C17D242DA6D2}" type="datetimeFigureOut">
               <a:rPr lang="zh-TW" altLang="en-US" smtClean="0"/>
-              <a:t>2025/1/6</a:t>
+              <a:t>2025/1/7</a:t>
             </a:fld>
             <a:endParaRPr lang="zh-TW" altLang="en-US"/>
           </a:p>
@@ -2682,7 +2682,7 @@
           <a:p>
             <a:fld id="{CA1AE8AC-2A7D-4E70-B7DE-C17D242DA6D2}" type="datetimeFigureOut">
               <a:rPr lang="zh-TW" altLang="en-US" smtClean="0"/>
-              <a:t>2025/1/6</a:t>
+              <a:t>2025/1/7</a:t>
             </a:fld>
             <a:endParaRPr lang="zh-TW" altLang="en-US"/>
           </a:p>
@@ -2795,7 +2795,7 @@
           <a:p>
             <a:fld id="{CA1AE8AC-2A7D-4E70-B7DE-C17D242DA6D2}" type="datetimeFigureOut">
               <a:rPr lang="zh-TW" altLang="en-US" smtClean="0"/>
-              <a:t>2025/1/6</a:t>
+              <a:t>2025/1/7</a:t>
             </a:fld>
             <a:endParaRPr lang="zh-TW" altLang="en-US"/>
           </a:p>
@@ -3106,7 +3106,7 @@
           <a:p>
             <a:fld id="{CA1AE8AC-2A7D-4E70-B7DE-C17D242DA6D2}" type="datetimeFigureOut">
               <a:rPr lang="zh-TW" altLang="en-US" smtClean="0"/>
-              <a:t>2025/1/6</a:t>
+              <a:t>2025/1/7</a:t>
             </a:fld>
             <a:endParaRPr lang="zh-TW" altLang="en-US"/>
           </a:p>
@@ -3394,7 +3394,7 @@
           <a:p>
             <a:fld id="{CA1AE8AC-2A7D-4E70-B7DE-C17D242DA6D2}" type="datetimeFigureOut">
               <a:rPr lang="zh-TW" altLang="en-US" smtClean="0"/>
-              <a:t>2025/1/6</a:t>
+              <a:t>2025/1/7</a:t>
             </a:fld>
             <a:endParaRPr lang="zh-TW" altLang="en-US"/>
           </a:p>
@@ -3635,7 +3635,7 @@
           <a:p>
             <a:fld id="{CA1AE8AC-2A7D-4E70-B7DE-C17D242DA6D2}" type="datetimeFigureOut">
               <a:rPr lang="zh-TW" altLang="en-US" smtClean="0"/>
-              <a:t>2025/1/6</a:t>
+              <a:t>2025/1/7</a:t>
             </a:fld>
             <a:endParaRPr lang="zh-TW" altLang="en-US"/>
           </a:p>
@@ -8134,7 +8134,7 @@
         </p:spPr>
         <p:txBody>
           <a:bodyPr>
-            <a:normAutofit fontScale="92500" lnSpcReduction="20000"/>
+            <a:normAutofit fontScale="92500" lnSpcReduction="10000"/>
           </a:bodyPr>
           <a:lstStyle/>
           <a:p>
@@ -8290,13 +8290,7 @@
             <a:pPr marL="0" indent="0">
               <a:buNone/>
             </a:pPr>
-            <a:br>
-              <a:rPr lang="en-US" altLang="zh-TW" dirty="0"/>
-            </a:br>
-            <a:r>
-              <a:rPr lang="en-US" altLang="zh-TW" dirty="0"/>
-              <a:t>5.chatgpt</a:t>
-            </a:r>
+            <a:endParaRPr lang="en-US" altLang="zh-TW" dirty="0"/>
           </a:p>
           <a:p>
             <a:pPr>

</xml_diff>